<commit_message>
add name into slide
</commit_message>
<xml_diff>
--- a/LTVXLDLL.pptx
+++ b/LTVXLDLL.pptx
@@ -6153,6 +6153,44 @@
             <a:r>
               <a:rPr lang="en-US" altLang="ko-KR" b="1"/>
               <a:t>ơng Lê Giang</a:t>
+            </a:r>
+          </a:p>
+          <a:p>
+            <a:pPr algn="r" fontAlgn="auto">
+              <a:spcBef>
+                <a:spcPts val="0"/>
+              </a:spcBef>
+              <a:spcAft>
+                <a:spcPts val="0"/>
+              </a:spcAft>
+              <a:defRPr/>
+            </a:pPr>
+            <a:r>
+              <a:rPr lang="en-US" altLang="ko-KR" b="1"/>
+              <a:t>Nguyễn Thành Nam</a:t>
+            </a:r>
+          </a:p>
+          <a:p>
+            <a:pPr algn="r" fontAlgn="auto">
+              <a:spcBef>
+                <a:spcPts val="0"/>
+              </a:spcBef>
+              <a:spcAft>
+                <a:spcPts val="0"/>
+              </a:spcAft>
+              <a:defRPr/>
+            </a:pPr>
+            <a:r>
+              <a:rPr lang="en-US" altLang="ko-KR" b="1"/>
+              <a:t>Nguyễn Đại Dư</a:t>
+            </a:r>
+            <a:r>
+              <a:rPr lang="vi-VN" altLang="ko-KR" b="1"/>
+              <a:t>ơ</a:t>
+            </a:r>
+            <a:r>
+              <a:rPr lang="en-US" altLang="ko-KR" b="1"/>
+              <a:t>ng</a:t>
             </a:r>
             <a:endParaRPr lang="en-US" altLang="ko-KR" b="1" dirty="0"/>
           </a:p>
@@ -11484,6 +11522,40 @@
           </a:p>
         </p:txBody>
       </p:sp>
+      <p:sp>
+        <p:nvSpPr>
+          <p:cNvPr id="2" name="Rectangle 1">
+            <a:extLst>
+              <a:ext uri="{FF2B5EF4-FFF2-40B4-BE49-F238E27FC236}">
+                <a16:creationId xmlns:a16="http://schemas.microsoft.com/office/drawing/2014/main" id="{54D72E40-48BD-4261-AF43-8C947001DF3C}"/>
+              </a:ext>
+            </a:extLst>
+          </p:cNvPr>
+          <p:cNvSpPr/>
+          <p:nvPr/>
+        </p:nvSpPr>
+        <p:spPr>
+          <a:xfrm>
+            <a:off x="2051720" y="1131590"/>
+            <a:ext cx="4596130" cy="369332"/>
+          </a:xfrm>
+          <a:prstGeom prst="rect">
+            <a:avLst/>
+          </a:prstGeom>
+        </p:spPr>
+        <p:txBody>
+          <a:bodyPr wrap="none">
+            <a:spAutoFit/>
+          </a:bodyPr>
+          <a:lstStyle/>
+          <a:p>
+            <a:r>
+              <a:rPr lang="en-US"/>
+              <a:t>https://github.com/pvh1602/bigdata_project</a:t>
+            </a:r>
+          </a:p>
+        </p:txBody>
+      </p:sp>
     </p:spTree>
     <p:extLst>
       <p:ext uri="{BB962C8B-B14F-4D97-AF65-F5344CB8AC3E}">

</xml_diff>